<commit_message>
kis igazítás/poén kivétele pptben
</commit_message>
<xml_diff>
--- a/IKTProjwPeter.pptx
+++ b/IKTProjwPeter.pptx
@@ -5840,19 +5840,7 @@
           <a:p>
             <a:r>
               <a:rPr lang="hu-HU" dirty="0" smtClean="0"/>
-              <a:t>Csapattagok: Én </a:t>
-            </a:r>
-            <a:r>
-              <a:rPr lang="hu-HU" dirty="0" err="1" smtClean="0"/>
-              <a:t>peti</a:t>
-            </a:r>
-            <a:r>
-              <a:rPr lang="hu-HU" dirty="0" smtClean="0"/>
-              <a:t> </a:t>
-            </a:r>
-            <a:r>
-              <a:rPr lang="hu-HU" dirty="0" err="1" smtClean="0"/>
-              <a:t>dani</a:t>
+              <a:t>Csapattagok: Szabó Péter, Baranyi Dániel, Kerék Ádám</a:t>
             </a:r>
             <a:endParaRPr lang="hu-HU" dirty="0"/>
           </a:p>
@@ -5905,7 +5893,7 @@
           <a:p>
             <a:r>
               <a:rPr lang="hu-HU" dirty="0" smtClean="0"/>
-              <a:t>ÉN mit csináltam</a:t>
+              <a:t>Ádám munkája</a:t>
             </a:r>
             <a:endParaRPr lang="hu-HU" dirty="0"/>
           </a:p>
@@ -5924,67 +5912,49 @@
         <p:spPr/>
         <p:txBody>
           <a:bodyPr>
-            <a:normAutofit fontScale="92500" lnSpcReduction="20000"/>
+            <a:normAutofit/>
           </a:bodyPr>
           <a:lstStyle/>
           <a:p>
             <a:r>
               <a:rPr lang="hu-HU" dirty="0" smtClean="0"/>
-              <a:t>Hát </a:t>
-            </a:r>
+              <a:t>Grafikonok létrehozása</a:t>
+            </a:r>
+          </a:p>
+          <a:p>
+            <a:r>
+              <a:rPr lang="hu-HU" dirty="0" smtClean="0"/>
+              <a:t>A 3 leghosszabb sorozatot tartalmazó számsor kinyerése</a:t>
+            </a:r>
+          </a:p>
+          <a:p>
+            <a:r>
+              <a:rPr lang="hu-HU" dirty="0" smtClean="0"/>
+              <a:t>Képek szerkesztése</a:t>
+            </a:r>
+          </a:p>
+          <a:p>
             <a:r>
               <a:rPr lang="hu-HU" dirty="0" err="1" smtClean="0"/>
-              <a:t>nemsokmindent</a:t>
+              <a:t>Html</a:t>
             </a:r>
             <a:r>
               <a:rPr lang="hu-HU" dirty="0" smtClean="0"/>
-              <a:t>, de a grafikonok megvannak.</a:t>
-            </a:r>
-          </a:p>
-          <a:p>
+              <a:t> illetve </a:t>
+            </a:r>
+            <a:r>
+              <a:rPr lang="hu-HU" dirty="0" err="1" smtClean="0"/>
+              <a:t>Css</a:t>
+            </a:r>
             <a:r>
               <a:rPr lang="hu-HU" dirty="0" smtClean="0"/>
-              <a:t>Megcsináltam mind a 3 leghosszabb sorozatot tartalmazó számsor kinyerését</a:t>
+              <a:t> fájlok szépítése, javítása</a:t>
             </a:r>
           </a:p>
           <a:p>
             <a:r>
               <a:rPr lang="hu-HU" dirty="0" smtClean="0"/>
-              <a:t>Képeket szerkesztettem</a:t>
-            </a:r>
-          </a:p>
-          <a:p>
-            <a:r>
-              <a:rPr lang="hu-HU" dirty="0" smtClean="0"/>
-              <a:t>FEJBŐL írtam a lottós történetet</a:t>
-            </a:r>
-          </a:p>
-          <a:p>
-            <a:r>
-              <a:rPr lang="hu-HU" dirty="0" smtClean="0"/>
-              <a:t>Egy kis </a:t>
-            </a:r>
-            <a:r>
-              <a:rPr lang="hu-HU" dirty="0" err="1" smtClean="0"/>
-              <a:t>hátéemel</a:t>
-            </a:r>
-            <a:r>
-              <a:rPr lang="hu-HU" dirty="0" smtClean="0"/>
-              <a:t> </a:t>
-            </a:r>
-            <a:r>
-              <a:rPr lang="hu-HU" dirty="0" err="1" smtClean="0"/>
-              <a:t>céeses</a:t>
-            </a:r>
-            <a:r>
-              <a:rPr lang="hu-HU" dirty="0" smtClean="0"/>
-              <a:t> kijavítottam egy két hibát itt ott</a:t>
-            </a:r>
-          </a:p>
-          <a:p>
-            <a:r>
-              <a:rPr lang="hu-HU" dirty="0" smtClean="0"/>
-              <a:t>Én csináltam a pépétét</a:t>
+              <a:t>Bemutató elkészítése</a:t>
             </a:r>
           </a:p>
           <a:p>
@@ -5992,21 +5962,6 @@
               <a:rPr lang="hu-HU" dirty="0" smtClean="0"/>
               <a:t>Adatelemzés CSV fájlból</a:t>
             </a:r>
-          </a:p>
-          <a:p>
-            <a:r>
-              <a:rPr lang="hu-HU" dirty="0" smtClean="0"/>
-              <a:t>Déli </a:t>
-            </a:r>
-            <a:r>
-              <a:rPr lang="hu-HU" dirty="0" err="1" smtClean="0"/>
-              <a:t>scrumon</a:t>
-            </a:r>
-            <a:r>
-              <a:rPr lang="hu-HU" dirty="0" smtClean="0"/>
-              <a:t> megjelenés ( nem délben)</a:t>
-            </a:r>
-            <a:endParaRPr lang="hu-HU" dirty="0"/>
           </a:p>
         </p:txBody>
       </p:sp>
@@ -6057,7 +6012,7 @@
           <a:p>
             <a:r>
               <a:rPr lang="hu-HU" dirty="0" smtClean="0"/>
-              <a:t>Péter mit csinált</a:t>
+              <a:t>Péter munkája</a:t>
             </a:r>
             <a:endParaRPr lang="hu-HU" dirty="0"/>
           </a:p>
@@ -6181,7 +6136,7 @@
           <a:p>
             <a:r>
               <a:rPr lang="hu-HU" dirty="0" smtClean="0"/>
-              <a:t>Dani mit csinált</a:t>
+              <a:t>Dani munkája</a:t>
             </a:r>
             <a:endParaRPr lang="hu-HU" dirty="0"/>
           </a:p>
@@ -6259,12 +6214,12 @@
               <a:t>bugok</a:t>
             </a:r>
             <a:r>
-              <a:rPr lang="hu-HU" smtClean="0"/>
+              <a:rPr lang="hu-HU" dirty="0" smtClean="0"/>
               <a:t>) kijavítása</a:t>
             </a:r>
           </a:p>
           <a:p>
-            <a:endParaRPr lang="hu-HU"/>
+            <a:endParaRPr lang="hu-HU" dirty="0"/>
           </a:p>
         </p:txBody>
       </p:sp>

</xml_diff>